<commit_message>
lowercase letters only (looks better???)
</commit_message>
<xml_diff>
--- a/presentationHack4tk.pptx
+++ b/presentationHack4tk.pptx
@@ -3337,8 +3337,8 @@
         </p:nvSpPr>
         <p:spPr>
           <a:xfrm>
-            <a:off x="3610466" y="3415017"/>
-            <a:ext cx="4616777" cy="707886"/>
+            <a:off x="3635312" y="3415017"/>
+            <a:ext cx="4567084" cy="707886"/>
           </a:xfrm>
           <a:prstGeom prst="rect">
             <a:avLst/>
@@ -3358,7 +3358,7 @@
                   <a:schemeClr val="bg1"/>
                 </a:solidFill>
               </a:rPr>
-              <a:t>„Elevator </a:t>
+              <a:t>„</a:t>
             </a:r>
             <a:r>
               <a:rPr lang="de-DE" sz="4000" b="1" dirty="0" err="1">
@@ -3366,7 +3366,23 @@
                   <a:schemeClr val="bg1"/>
                 </a:solidFill>
               </a:rPr>
-              <a:t>Algorithm</a:t>
+              <a:t>elevator</a:t>
+            </a:r>
+            <a:r>
+              <a:rPr lang="de-DE" sz="4000" b="1" dirty="0">
+                <a:solidFill>
+                  <a:schemeClr val="bg1"/>
+                </a:solidFill>
+              </a:rPr>
+              <a:t> </a:t>
+            </a:r>
+            <a:r>
+              <a:rPr lang="de-DE" sz="4000" b="1" dirty="0" err="1">
+                <a:solidFill>
+                  <a:schemeClr val="bg1"/>
+                </a:solidFill>
+              </a:rPr>
+              <a:t>algorithm</a:t>
             </a:r>
             <a:r>
               <a:rPr lang="de-DE" sz="4000" b="1" dirty="0">
@@ -3396,7 +3412,7 @@
         <p:spPr>
           <a:xfrm>
             <a:off x="4945091" y="4371338"/>
-            <a:ext cx="1625510" cy="369332"/>
+            <a:ext cx="1535549" cy="369332"/>
           </a:xfrm>
           <a:prstGeom prst="rect">
             <a:avLst/>
@@ -3439,7 +3455,23 @@
                   <a:schemeClr val="bg1"/>
                 </a:solidFill>
               </a:rPr>
-              <a:t> MOJO </a:t>
+              <a:t> </a:t>
+            </a:r>
+            <a:r>
+              <a:rPr lang="de-DE" dirty="0" err="1">
+                <a:solidFill>
+                  <a:schemeClr val="bg1"/>
+                </a:solidFill>
+              </a:rPr>
+              <a:t>mojo</a:t>
+            </a:r>
+            <a:r>
+              <a:rPr lang="de-DE" dirty="0">
+                <a:solidFill>
+                  <a:schemeClr val="bg1"/>
+                </a:solidFill>
+              </a:rPr>
+              <a:t> </a:t>
             </a:r>
           </a:p>
         </p:txBody>
@@ -3524,7 +3556,7 @@
         <p:spPr>
           <a:xfrm>
             <a:off x="779245" y="1252025"/>
-            <a:ext cx="2788456" cy="923330"/>
+            <a:ext cx="2687467" cy="923330"/>
           </a:xfrm>
           <a:prstGeom prst="rect">
             <a:avLst/>
@@ -3538,16 +3570,24 @@
           <a:lstStyle/>
           <a:p>
             <a:r>
-              <a:rPr lang="de-DE" sz="5400" b="1" dirty="0">
-                <a:solidFill>
-                  <a:schemeClr val="bg1"/>
-                </a:solidFill>
-                <a:latin typeface="Lato Light" charset="0"/>
-                <a:ea typeface="Lato Light" charset="0"/>
-                <a:cs typeface="Lato Light" charset="0"/>
-              </a:rPr>
-              <a:t>Content</a:t>
-            </a:r>
+              <a:rPr lang="de-DE" sz="5400" b="1" dirty="0" err="1">
+                <a:solidFill>
+                  <a:schemeClr val="bg1"/>
+                </a:solidFill>
+                <a:latin typeface="Lato Light" charset="0"/>
+                <a:ea typeface="Lato Light" charset="0"/>
+                <a:cs typeface="Lato Light" charset="0"/>
+              </a:rPr>
+              <a:t>content</a:t>
+            </a:r>
+            <a:endParaRPr lang="de-DE" sz="5400" b="1" dirty="0">
+              <a:solidFill>
+                <a:schemeClr val="bg1"/>
+              </a:solidFill>
+              <a:latin typeface="Lato Light" charset="0"/>
+              <a:ea typeface="Lato Light" charset="0"/>
+              <a:cs typeface="Lato Light" charset="0"/>
+            </a:endParaRPr>
           </a:p>
         </p:txBody>
       </p:sp>
@@ -3629,7 +3669,7 @@
         <p:spPr>
           <a:xfrm>
             <a:off x="946484" y="3160295"/>
-            <a:ext cx="1869614" cy="2585323"/>
+            <a:ext cx="1843966" cy="2585323"/>
           </a:xfrm>
           <a:prstGeom prst="rect">
             <a:avLst/>
@@ -3661,7 +3701,7 @@
                 <a:ea typeface="Lato Light" charset="0"/>
                 <a:cs typeface="Lato Light" charset="0"/>
               </a:rPr>
-              <a:t>Introduction</a:t>
+              <a:t>introduction</a:t>
             </a:r>
             <a:r>
               <a:rPr lang="de-DE" dirty="0">
@@ -3687,6 +3727,17 @@
               <a:buChar char="•"/>
             </a:pPr>
             <a:r>
+              <a:rPr lang="de-DE" dirty="0" err="1">
+                <a:solidFill>
+                  <a:schemeClr val="bg1"/>
+                </a:solidFill>
+                <a:latin typeface="Lato Light" charset="0"/>
+                <a:ea typeface="Lato Light" charset="0"/>
+                <a:cs typeface="Lato Light" charset="0"/>
+              </a:rPr>
+              <a:t>daily</a:t>
+            </a:r>
+            <a:r>
               <a:rPr lang="de-DE" dirty="0">
                 <a:solidFill>
                   <a:schemeClr val="bg1"/>
@@ -3695,7 +3746,7 @@
                 <a:ea typeface="Lato Light" charset="0"/>
                 <a:cs typeface="Lato Light" charset="0"/>
               </a:rPr>
-              <a:t>Daily </a:t>
+              <a:t> </a:t>
             </a:r>
             <a:r>
               <a:rPr lang="de-DE" dirty="0" err="1">
@@ -3729,16 +3780,24 @@
               <a:buChar char="•"/>
             </a:pPr>
             <a:r>
-              <a:rPr lang="de-DE" dirty="0">
-                <a:solidFill>
-                  <a:schemeClr val="bg1"/>
-                </a:solidFill>
-                <a:latin typeface="Lato Light" charset="0"/>
-                <a:ea typeface="Lato Light" charset="0"/>
-                <a:cs typeface="Lato Light" charset="0"/>
-              </a:rPr>
-              <a:t>Demo</a:t>
-            </a:r>
+              <a:rPr lang="de-DE" dirty="0" err="1">
+                <a:solidFill>
+                  <a:schemeClr val="bg1"/>
+                </a:solidFill>
+                <a:latin typeface="Lato Light" charset="0"/>
+                <a:ea typeface="Lato Light" charset="0"/>
+                <a:cs typeface="Lato Light" charset="0"/>
+              </a:rPr>
+              <a:t>demo</a:t>
+            </a:r>
+            <a:endParaRPr lang="de-DE" dirty="0">
+              <a:solidFill>
+                <a:schemeClr val="bg1"/>
+              </a:solidFill>
+              <a:latin typeface="Lato Light" charset="0"/>
+              <a:ea typeface="Lato Light" charset="0"/>
+              <a:cs typeface="Lato Light" charset="0"/>
+            </a:endParaRPr>
           </a:p>
           <a:p>
             <a:pPr marL="285750" indent="-285750">
@@ -3760,7 +3819,7 @@
                 <a:ea typeface="Lato Light" charset="0"/>
                 <a:cs typeface="Lato Light" charset="0"/>
               </a:rPr>
-              <a:t>Our</a:t>
+              <a:t>our</a:t>
             </a:r>
             <a:r>
               <a:rPr lang="de-DE" dirty="0">
@@ -3813,7 +3872,7 @@
                 <a:ea typeface="Lato Light" charset="0"/>
                 <a:cs typeface="Lato Light" charset="0"/>
               </a:rPr>
-              <a:t>Example</a:t>
+              <a:t>example</a:t>
             </a:r>
             <a:endParaRPr lang="de-DE" dirty="0">
               <a:solidFill>
@@ -3844,7 +3903,7 @@
                 <a:ea typeface="Lato Light" charset="0"/>
                 <a:cs typeface="Lato Light" charset="0"/>
               </a:rPr>
-              <a:t>Conclusion</a:t>
+              <a:t>conclusion</a:t>
             </a:r>
             <a:endParaRPr lang="de-DE" dirty="0">
               <a:solidFill>
@@ -3949,7 +4008,7 @@
         <p:spPr>
           <a:xfrm>
             <a:off x="779245" y="1252025"/>
-            <a:ext cx="3949030" cy="923330"/>
+            <a:ext cx="3933000" cy="923330"/>
           </a:xfrm>
           <a:prstGeom prst="rect">
             <a:avLst/>
@@ -3971,7 +4030,7 @@
                 <a:ea typeface="Lato Light" charset="0"/>
                 <a:cs typeface="Lato Light" charset="0"/>
               </a:rPr>
-              <a:t>Introduction</a:t>
+              <a:t>introduction</a:t>
             </a:r>
             <a:endParaRPr lang="de-DE" sz="5400" dirty="0">
               <a:solidFill>
@@ -4154,7 +4213,7 @@
                 <a:ea typeface="Lato Light" charset="0"/>
                 <a:cs typeface="Lato Light" charset="0"/>
               </a:rPr>
-              <a:t>Fast and Smart </a:t>
+              <a:t>fast and Smart </a:t>
             </a:r>
             <a:r>
               <a:rPr lang="de-DE" dirty="0" err="1">
@@ -4344,7 +4403,7 @@
                 <a:ea typeface="Lato Light" charset="0"/>
                 <a:cs typeface="Lato Light" charset="0"/>
               </a:rPr>
-              <a:t>Notification</a:t>
+              <a:t>notification</a:t>
             </a:r>
             <a:r>
               <a:rPr lang="de-DE" dirty="0">
@@ -4650,7 +4709,7 @@
         <p:spPr>
           <a:xfrm>
             <a:off x="779245" y="1252025"/>
-            <a:ext cx="4377032" cy="923330"/>
+            <a:ext cx="4298484" cy="923330"/>
           </a:xfrm>
           <a:prstGeom prst="rect">
             <a:avLst/>
@@ -4664,6 +4723,17 @@
           <a:lstStyle/>
           <a:p>
             <a:r>
+              <a:rPr lang="de-DE" sz="5400" dirty="0" err="1">
+                <a:solidFill>
+                  <a:schemeClr val="bg1"/>
+                </a:solidFill>
+                <a:latin typeface="Lato Light" charset="0"/>
+                <a:ea typeface="Lato Light" charset="0"/>
+                <a:cs typeface="Lato Light" charset="0"/>
+              </a:rPr>
+              <a:t>daily</a:t>
+            </a:r>
+            <a:r>
               <a:rPr lang="de-DE" sz="5400" dirty="0">
                 <a:solidFill>
                   <a:schemeClr val="bg1"/>
@@ -4672,7 +4742,7 @@
                 <a:ea typeface="Lato Light" charset="0"/>
                 <a:cs typeface="Lato Light" charset="0"/>
               </a:rPr>
-              <a:t>Daily </a:t>
+              <a:t> </a:t>
             </a:r>
             <a:r>
               <a:rPr lang="de-DE" sz="5400" dirty="0" err="1">
@@ -4915,8 +4985,8 @@
         </p:nvSpPr>
         <p:spPr>
           <a:xfrm rot="20598976">
-            <a:off x="8942926" y="3135553"/>
-            <a:ext cx="1170257" cy="307777"/>
+            <a:off x="8920484" y="3135553"/>
+            <a:ext cx="1215141" cy="307777"/>
           </a:xfrm>
           <a:prstGeom prst="rect">
             <a:avLst/>
@@ -4935,7 +5005,7 @@
                 <a:ea typeface="Lato" charset="0"/>
                 <a:cs typeface="Lato" charset="0"/>
               </a:rPr>
-              <a:t>overcrowdet</a:t>
+              <a:t>overcrowded</a:t>
             </a:r>
             <a:endParaRPr lang="de-DE" sz="1400" dirty="0">
               <a:latin typeface="Lato" charset="0"/>
@@ -5018,7 +5088,7 @@
                 <a:ea typeface="Lato Light" charset="0"/>
                 <a:cs typeface="Lato Light" charset="0"/>
               </a:rPr>
-              <a:t>Crowded</a:t>
+              <a:t>crowded</a:t>
             </a:r>
             <a:r>
               <a:rPr lang="de-DE" dirty="0">
@@ -5057,6 +5127,17 @@
               <a:buChar char="•"/>
             </a:pPr>
             <a:r>
+              <a:rPr lang="de-DE" dirty="0" err="1">
+                <a:solidFill>
+                  <a:schemeClr val="bg1"/>
+                </a:solidFill>
+                <a:latin typeface="Lato Light" charset="0"/>
+                <a:ea typeface="Lato Light" charset="0"/>
+                <a:cs typeface="Lato Light" charset="0"/>
+              </a:rPr>
+              <a:t>long</a:t>
+            </a:r>
+            <a:r>
               <a:rPr lang="de-DE" dirty="0">
                 <a:solidFill>
                   <a:schemeClr val="bg1"/>
@@ -5065,7 +5146,7 @@
                 <a:ea typeface="Lato Light" charset="0"/>
                 <a:cs typeface="Lato Light" charset="0"/>
               </a:rPr>
-              <a:t>Long </a:t>
+              <a:t> </a:t>
             </a:r>
             <a:r>
               <a:rPr lang="de-DE" dirty="0" err="1">
@@ -5118,6 +5199,17 @@
               <a:buChar char="•"/>
             </a:pPr>
             <a:r>
+              <a:rPr lang="de-DE" dirty="0" err="1">
+                <a:solidFill>
+                  <a:schemeClr val="bg1"/>
+                </a:solidFill>
+                <a:latin typeface="Lato Light" charset="0"/>
+                <a:ea typeface="Lato Light" charset="0"/>
+                <a:cs typeface="Lato Light" charset="0"/>
+              </a:rPr>
+              <a:t>long</a:t>
+            </a:r>
+            <a:r>
               <a:rPr lang="de-DE" dirty="0">
                 <a:solidFill>
                   <a:schemeClr val="bg1"/>
@@ -5126,7 +5218,7 @@
                 <a:ea typeface="Lato Light" charset="0"/>
                 <a:cs typeface="Lato Light" charset="0"/>
               </a:rPr>
-              <a:t>Long </a:t>
+              <a:t> </a:t>
             </a:r>
             <a:r>
               <a:rPr lang="de-DE" dirty="0" err="1">
@@ -5581,7 +5673,7 @@
         <p:spPr>
           <a:xfrm>
             <a:off x="779245" y="1252025"/>
-            <a:ext cx="2034531" cy="923330"/>
+            <a:ext cx="1955985" cy="923330"/>
           </a:xfrm>
           <a:prstGeom prst="rect">
             <a:avLst/>
@@ -5595,16 +5687,24 @@
           <a:lstStyle/>
           <a:p>
             <a:r>
-              <a:rPr lang="de-DE" sz="5400" dirty="0">
-                <a:solidFill>
-                  <a:schemeClr val="bg1"/>
-                </a:solidFill>
-                <a:latin typeface="Lato Light" charset="0"/>
-                <a:ea typeface="Lato Light" charset="0"/>
-                <a:cs typeface="Lato Light" charset="0"/>
-              </a:rPr>
-              <a:t>Demo</a:t>
-            </a:r>
+              <a:rPr lang="de-DE" sz="5400" dirty="0" err="1">
+                <a:solidFill>
+                  <a:schemeClr val="bg1"/>
+                </a:solidFill>
+                <a:latin typeface="Lato Light" charset="0"/>
+                <a:ea typeface="Lato Light" charset="0"/>
+                <a:cs typeface="Lato Light" charset="0"/>
+              </a:rPr>
+              <a:t>demo</a:t>
+            </a:r>
+            <a:endParaRPr lang="de-DE" sz="5400" dirty="0">
+              <a:solidFill>
+                <a:schemeClr val="bg1"/>
+              </a:solidFill>
+              <a:latin typeface="Lato Light" charset="0"/>
+              <a:ea typeface="Lato Light" charset="0"/>
+              <a:cs typeface="Lato Light" charset="0"/>
+            </a:endParaRPr>
           </a:p>
         </p:txBody>
       </p:sp>
@@ -5823,7 +5923,7 @@
         <p:spPr>
           <a:xfrm>
             <a:off x="779245" y="1252025"/>
-            <a:ext cx="3985386" cy="923330"/>
+            <a:ext cx="3868367" cy="923330"/>
           </a:xfrm>
           <a:prstGeom prst="rect">
             <a:avLst/>
@@ -5845,7 +5945,7 @@
                 <a:ea typeface="Lato Light" charset="0"/>
                 <a:cs typeface="Lato Light" charset="0"/>
               </a:rPr>
-              <a:t>Our</a:t>
+              <a:t>our</a:t>
             </a:r>
             <a:r>
               <a:rPr lang="de-DE" sz="5400" dirty="0">
@@ -6546,7 +6646,7 @@
         <p:spPr>
           <a:xfrm>
             <a:off x="779245" y="1252025"/>
-            <a:ext cx="3547766" cy="923330"/>
+            <a:ext cx="3440365" cy="923330"/>
           </a:xfrm>
           <a:prstGeom prst="rect">
             <a:avLst/>
@@ -6568,7 +6668,7 @@
                 <a:ea typeface="Lato Light" charset="0"/>
                 <a:cs typeface="Lato Light" charset="0"/>
               </a:rPr>
-              <a:t>Conclusion</a:t>
+              <a:t>conclusion</a:t>
             </a:r>
             <a:endParaRPr lang="de-DE" sz="5400" dirty="0">
               <a:solidFill>
@@ -6751,7 +6851,7 @@
                 <a:ea typeface="Lato Light" charset="0"/>
                 <a:cs typeface="Lato Light" charset="0"/>
               </a:rPr>
-              <a:t>No</a:t>
+              <a:t>no</a:t>
             </a:r>
             <a:r>
               <a:rPr lang="de-DE" sz="2000" dirty="0">
@@ -6908,7 +7008,7 @@
                 <a:ea typeface="Lato Light" charset="0"/>
                 <a:cs typeface="Lato Light" charset="0"/>
               </a:rPr>
-              <a:t>Spending</a:t>
+              <a:t>spending</a:t>
             </a:r>
             <a:r>
               <a:rPr lang="de-DE" sz="2000" dirty="0">
@@ -6980,7 +7080,7 @@
                 <a:ea typeface="Lato Light" charset="0"/>
                 <a:cs typeface="Lato Light" charset="0"/>
               </a:rPr>
-              <a:t>Fastest </a:t>
+              <a:t>fastest </a:t>
             </a:r>
             <a:r>
               <a:rPr lang="de-DE" sz="2000" dirty="0" err="1">
@@ -7082,7 +7182,7 @@
                 <a:ea typeface="Lato Light" charset="0"/>
                 <a:cs typeface="Lato Light" charset="0"/>
               </a:rPr>
-              <a:t>Notification</a:t>
+              <a:t>notification</a:t>
             </a:r>
             <a:r>
               <a:rPr lang="de-DE" sz="2000" dirty="0">
@@ -7364,7 +7464,7 @@
                 <a:ea typeface="Lato Light" charset="0"/>
                 <a:cs typeface="Lato Light" charset="0"/>
               </a:rPr>
-              <a:t>Thank</a:t>
+              <a:t>thank</a:t>
             </a:r>
             <a:r>
               <a:rPr lang="de-DE" sz="3600" dirty="0">

</xml_diff>

<commit_message>
added Pic for presentation
</commit_message>
<xml_diff>
--- a/presentationHack4tk.pptx
+++ b/presentationHack4tk.pptx
@@ -3958,6 +3958,42 @@
           </a:p>
         </p:txBody>
       </p:sp>
+      <p:pic>
+        <p:nvPicPr>
+          <p:cNvPr id="5" name="Bild 15">
+            <a:extLst>
+              <a:ext uri="{FF2B5EF4-FFF2-40B4-BE49-F238E27FC236}">
+                <a16:creationId xmlns:a16="http://schemas.microsoft.com/office/drawing/2014/main" id="{0F3A9D2B-AF2F-46DC-82F0-C11816E03332}"/>
+              </a:ext>
+            </a:extLst>
+          </p:cNvPr>
+          <p:cNvPicPr>
+            <a:picLocks noChangeAspect="1"/>
+          </p:cNvPicPr>
+          <p:nvPr/>
+        </p:nvPicPr>
+        <p:blipFill>
+          <a:blip r:embed="rId2">
+            <a:extLst>
+              <a:ext uri="{28A0092B-C50C-407E-A947-70E740481C1C}">
+                <a14:useLocalDpi xmlns:a14="http://schemas.microsoft.com/office/drawing/2010/main" val="0"/>
+              </a:ext>
+            </a:extLst>
+          </a:blip>
+          <a:stretch>
+            <a:fillRect/>
+          </a:stretch>
+        </p:blipFill>
+        <p:spPr>
+          <a:xfrm>
+            <a:off x="10626624" y="115249"/>
+            <a:ext cx="1426029" cy="1101607"/>
+          </a:xfrm>
+          <a:prstGeom prst="rect">
+            <a:avLst/>
+          </a:prstGeom>
+        </p:spPr>
+      </p:pic>
     </p:spTree>
     <p:extLst>
       <p:ext uri="{BB962C8B-B14F-4D97-AF65-F5344CB8AC3E}">
@@ -4170,7 +4206,7 @@
         </p:blipFill>
         <p:spPr>
           <a:xfrm>
-            <a:off x="10626624" y="150418"/>
+            <a:off x="10626624" y="115249"/>
             <a:ext cx="1426029" cy="1101607"/>
           </a:xfrm>
           <a:prstGeom prst="rect">
@@ -4187,7 +4223,7 @@
         <p:spPr>
           <a:xfrm>
             <a:off x="946484" y="3160295"/>
-            <a:ext cx="7041030" cy="1477328"/>
+            <a:ext cx="5467138" cy="1754326"/>
           </a:xfrm>
           <a:prstGeom prst="rect">
             <a:avLst/>
@@ -4237,17 +4273,12 @@
               </a:rPr>
               <a:t> </a:t>
             </a:r>
-            <a:r>
-              <a:rPr lang="de-DE" dirty="0" err="1">
-                <a:solidFill>
-                  <a:schemeClr val="bg1"/>
-                </a:solidFill>
-                <a:latin typeface="Lato Light" charset="0"/>
-                <a:ea typeface="Lato Light" charset="0"/>
-                <a:cs typeface="Lato Light" charset="0"/>
-              </a:rPr>
-              <a:t>to</a:t>
-            </a:r>
+          </a:p>
+          <a:p>
+            <a:pPr marL="285750" indent="-285750">
+              <a:buFont typeface="Arial" charset="0"/>
+              <a:buChar char="•"/>
+            </a:pPr>
             <a:r>
               <a:rPr lang="de-DE" dirty="0">
                 <a:solidFill>
@@ -4257,7 +4288,7 @@
                 <a:ea typeface="Lato Light" charset="0"/>
                 <a:cs typeface="Lato Light" charset="0"/>
               </a:rPr>
-              <a:t> find </a:t>
+              <a:t>find </a:t>
             </a:r>
             <a:r>
               <a:rPr lang="de-DE" dirty="0" err="1">

</xml_diff>